<commit_message>
- cleaned out/update presentations materials
</commit_message>
<xml_diff>
--- a/presentations/0-Welcome.pptx
+++ b/presentations/0-Welcome.pptx
@@ -204,7 +204,7 @@
           <a:p>
             <a:fld id="{7AFDEBC5-B985-4DBD-971A-DE566E1C50A2}" type="datetimeFigureOut">
               <a:rPr lang="nl-NL" smtClean="0"/>
-              <a:t>1-12-2023</a:t>
+              <a:t>18-11-2024</a:t>
             </a:fld>
             <a:endParaRPr lang="nl-NL"/>
           </a:p>
@@ -789,7 +789,7 @@
           <a:p>
             <a:fld id="{8C03529F-F810-4FC9-BD64-0B4367090BD1}" type="datetimeFigureOut">
               <a:rPr lang="nl-NL" smtClean="0"/>
-              <a:t>1-12-2023</a:t>
+              <a:t>18-11-2024</a:t>
             </a:fld>
             <a:endParaRPr lang="nl-NL"/>
           </a:p>
@@ -989,7 +989,7 @@
           <a:p>
             <a:fld id="{8C03529F-F810-4FC9-BD64-0B4367090BD1}" type="datetimeFigureOut">
               <a:rPr lang="nl-NL" smtClean="0"/>
-              <a:t>1-12-2023</a:t>
+              <a:t>18-11-2024</a:t>
             </a:fld>
             <a:endParaRPr lang="nl-NL"/>
           </a:p>
@@ -1199,7 +1199,7 @@
           <a:p>
             <a:fld id="{8C03529F-F810-4FC9-BD64-0B4367090BD1}" type="datetimeFigureOut">
               <a:rPr lang="nl-NL" smtClean="0"/>
-              <a:t>1-12-2023</a:t>
+              <a:t>18-11-2024</a:t>
             </a:fld>
             <a:endParaRPr lang="nl-NL"/>
           </a:p>
@@ -1419,7 +1419,7 @@
           <a:p>
             <a:fld id="{2BE7F1A7-46C0-614C-8973-2677197B1A3C}" type="datetimeFigureOut">
               <a:rPr lang="en-US" smtClean="0"/>
-              <a:t>12/1/2023</a:t>
+              <a:t>11/18/2024</a:t>
             </a:fld>
             <a:endParaRPr lang="en-US"/>
           </a:p>
@@ -1617,7 +1617,7 @@
           <a:p>
             <a:fld id="{2BE7F1A7-46C0-614C-8973-2677197B1A3C}" type="datetimeFigureOut">
               <a:rPr lang="en-US" smtClean="0"/>
-              <a:t>12/1/2023</a:t>
+              <a:t>11/18/2024</a:t>
             </a:fld>
             <a:endParaRPr lang="en-US"/>
           </a:p>
@@ -1892,7 +1892,7 @@
           <a:p>
             <a:fld id="{2BE7F1A7-46C0-614C-8973-2677197B1A3C}" type="datetimeFigureOut">
               <a:rPr lang="en-US" smtClean="0"/>
-              <a:t>12/1/2023</a:t>
+              <a:t>11/18/2024</a:t>
             </a:fld>
             <a:endParaRPr lang="en-US"/>
           </a:p>
@@ -2157,7 +2157,7 @@
           <a:p>
             <a:fld id="{2BE7F1A7-46C0-614C-8973-2677197B1A3C}" type="datetimeFigureOut">
               <a:rPr lang="en-US" smtClean="0"/>
-              <a:t>12/1/2023</a:t>
+              <a:t>11/18/2024</a:t>
             </a:fld>
             <a:endParaRPr lang="en-US"/>
           </a:p>
@@ -2569,7 +2569,7 @@
           <a:p>
             <a:fld id="{2BE7F1A7-46C0-614C-8973-2677197B1A3C}" type="datetimeFigureOut">
               <a:rPr lang="en-US" smtClean="0"/>
-              <a:t>12/1/2023</a:t>
+              <a:t>11/18/2024</a:t>
             </a:fld>
             <a:endParaRPr lang="en-US"/>
           </a:p>
@@ -2710,7 +2710,7 @@
           <a:p>
             <a:fld id="{2BE7F1A7-46C0-614C-8973-2677197B1A3C}" type="datetimeFigureOut">
               <a:rPr lang="en-US" smtClean="0"/>
-              <a:t>12/1/2023</a:t>
+              <a:t>11/18/2024</a:t>
             </a:fld>
             <a:endParaRPr lang="en-US"/>
           </a:p>
@@ -2823,7 +2823,7 @@
           <a:p>
             <a:fld id="{2BE7F1A7-46C0-614C-8973-2677197B1A3C}" type="datetimeFigureOut">
               <a:rPr lang="en-US" smtClean="0"/>
-              <a:t>12/1/2023</a:t>
+              <a:t>11/18/2024</a:t>
             </a:fld>
             <a:endParaRPr lang="en-US"/>
           </a:p>
@@ -3134,7 +3134,7 @@
           <a:p>
             <a:fld id="{2BE7F1A7-46C0-614C-8973-2677197B1A3C}" type="datetimeFigureOut">
               <a:rPr lang="en-US" smtClean="0"/>
-              <a:t>12/1/2023</a:t>
+              <a:t>11/18/2024</a:t>
             </a:fld>
             <a:endParaRPr lang="en-US"/>
           </a:p>
@@ -3334,7 +3334,7 @@
           <a:p>
             <a:fld id="{8C03529F-F810-4FC9-BD64-0B4367090BD1}" type="datetimeFigureOut">
               <a:rPr lang="nl-NL" smtClean="0"/>
-              <a:t>1-12-2023</a:t>
+              <a:t>18-11-2024</a:t>
             </a:fld>
             <a:endParaRPr lang="nl-NL"/>
           </a:p>
@@ -3622,7 +3622,7 @@
           <a:p>
             <a:fld id="{2BE7F1A7-46C0-614C-8973-2677197B1A3C}" type="datetimeFigureOut">
               <a:rPr lang="en-US" smtClean="0"/>
-              <a:t>12/1/2023</a:t>
+              <a:t>11/18/2024</a:t>
             </a:fld>
             <a:endParaRPr lang="en-US"/>
           </a:p>
@@ -3820,7 +3820,7 @@
           <a:p>
             <a:fld id="{2BE7F1A7-46C0-614C-8973-2677197B1A3C}" type="datetimeFigureOut">
               <a:rPr lang="en-US" smtClean="0"/>
-              <a:t>12/1/2023</a:t>
+              <a:t>11/18/2024</a:t>
             </a:fld>
             <a:endParaRPr lang="en-US"/>
           </a:p>
@@ -4028,7 +4028,7 @@
           <a:p>
             <a:fld id="{2BE7F1A7-46C0-614C-8973-2677197B1A3C}" type="datetimeFigureOut">
               <a:rPr lang="en-US" smtClean="0"/>
-              <a:t>12/1/2023</a:t>
+              <a:t>11/18/2024</a:t>
             </a:fld>
             <a:endParaRPr lang="en-US"/>
           </a:p>
@@ -4334,7 +4334,7 @@
           <a:p>
             <a:fld id="{8C03529F-F810-4FC9-BD64-0B4367090BD1}" type="datetimeFigureOut">
               <a:rPr lang="nl-NL" smtClean="0"/>
-              <a:t>1-12-2023</a:t>
+              <a:t>18-11-2024</a:t>
             </a:fld>
             <a:endParaRPr lang="nl-NL"/>
           </a:p>
@@ -4602,7 +4602,7 @@
           <a:p>
             <a:fld id="{8C03529F-F810-4FC9-BD64-0B4367090BD1}" type="datetimeFigureOut">
               <a:rPr lang="nl-NL" smtClean="0"/>
-              <a:t>1-12-2023</a:t>
+              <a:t>18-11-2024</a:t>
             </a:fld>
             <a:endParaRPr lang="nl-NL"/>
           </a:p>
@@ -5017,7 +5017,7 @@
           <a:p>
             <a:fld id="{8C03529F-F810-4FC9-BD64-0B4367090BD1}" type="datetimeFigureOut">
               <a:rPr lang="nl-NL" smtClean="0"/>
-              <a:t>1-12-2023</a:t>
+              <a:t>18-11-2024</a:t>
             </a:fld>
             <a:endParaRPr lang="nl-NL"/>
           </a:p>
@@ -5159,7 +5159,7 @@
           <a:p>
             <a:fld id="{8C03529F-F810-4FC9-BD64-0B4367090BD1}" type="datetimeFigureOut">
               <a:rPr lang="nl-NL" smtClean="0"/>
-              <a:t>1-12-2023</a:t>
+              <a:t>18-11-2024</a:t>
             </a:fld>
             <a:endParaRPr lang="nl-NL"/>
           </a:p>
@@ -5272,7 +5272,7 @@
           <a:p>
             <a:fld id="{8C03529F-F810-4FC9-BD64-0B4367090BD1}" type="datetimeFigureOut">
               <a:rPr lang="nl-NL" smtClean="0"/>
-              <a:t>1-12-2023</a:t>
+              <a:t>18-11-2024</a:t>
             </a:fld>
             <a:endParaRPr lang="nl-NL"/>
           </a:p>
@@ -5585,7 +5585,7 @@
           <a:p>
             <a:fld id="{8C03529F-F810-4FC9-BD64-0B4367090BD1}" type="datetimeFigureOut">
               <a:rPr lang="nl-NL" smtClean="0"/>
-              <a:t>1-12-2023</a:t>
+              <a:t>18-11-2024</a:t>
             </a:fld>
             <a:endParaRPr lang="nl-NL"/>
           </a:p>
@@ -5874,7 +5874,7 @@
           <a:p>
             <a:fld id="{8C03529F-F810-4FC9-BD64-0B4367090BD1}" type="datetimeFigureOut">
               <a:rPr lang="nl-NL" smtClean="0"/>
-              <a:t>1-12-2023</a:t>
+              <a:t>18-11-2024</a:t>
             </a:fld>
             <a:endParaRPr lang="nl-NL"/>
           </a:p>
@@ -6117,7 +6117,7 @@
           <a:p>
             <a:fld id="{8C03529F-F810-4FC9-BD64-0B4367090BD1}" type="datetimeFigureOut">
               <a:rPr lang="nl-NL" smtClean="0"/>
-              <a:t>1-12-2023</a:t>
+              <a:t>18-11-2024</a:t>
             </a:fld>
             <a:endParaRPr lang="nl-NL"/>
           </a:p>
@@ -6685,7 +6685,7 @@
           <a:p>
             <a:fld id="{2BE7F1A7-46C0-614C-8973-2677197B1A3C}" type="datetimeFigureOut">
               <a:rPr lang="en-US" smtClean="0"/>
-              <a:t>12/1/2023</a:t>
+              <a:t>11/18/2024</a:t>
             </a:fld>
             <a:endParaRPr lang="en-US"/>
           </a:p>
@@ -7808,12 +7808,20 @@
           <a:p>
             <a:pPr algn="l"/>
             <a:r>
+              <a:rPr lang="en-US" sz="2000">
+                <a:solidFill>
+                  <a:srgbClr val="FFFFFF"/>
+                </a:solidFill>
+              </a:rPr>
+              <a:t>Advanced </a:t>
+            </a:r>
+            <a:r>
               <a:rPr lang="en-US" sz="2000" dirty="0">
                 <a:solidFill>
                   <a:srgbClr val="FFFFFF"/>
                 </a:solidFill>
               </a:rPr>
-              <a:t>Parallel MODFLOW Training Class</a:t>
+              <a:t>MODFLOW Training Class</a:t>
             </a:r>
             <a:r>
               <a:rPr lang="en-US" sz="2000">
@@ -7837,23 +7845,7 @@
                   <a:srgbClr val="FFFFFF"/>
                 </a:solidFill>
               </a:rPr>
-              <a:t>, </a:t>
-            </a:r>
-            <a:r>
-              <a:rPr lang="en-US" sz="2000" dirty="0">
-                <a:solidFill>
-                  <a:srgbClr val="FFFFFF"/>
-                </a:solidFill>
-              </a:rPr>
-              <a:t>2023</a:t>
-            </a:r>
-            <a:r>
-              <a:rPr lang="en-US" sz="2000">
-                <a:solidFill>
-                  <a:srgbClr val="FFFFFF"/>
-                </a:solidFill>
-              </a:rPr>
-              <a:t>, Deltares, NL</a:t>
+              <a:t>, 2024, Deltares, NL</a:t>
             </a:r>
             <a:endParaRPr lang="en-US" sz="2000" dirty="0">
               <a:solidFill>
@@ -7931,7 +7923,7 @@
           <a:noFill/>
           <a:extLst>
             <a:ext uri="{909E8E84-426E-40dd-AFC4-6F175D3DCCD1}">
-              <a14:hiddenFill xmlns:a14="http://schemas.microsoft.com/office/drawing/2010/main" xmlns="">
+              <a14:hiddenFill xmlns="" xmlns:a14="http://schemas.microsoft.com/office/drawing/2010/main">
                 <a:solidFill>
                   <a:srgbClr val="FFFFFF"/>
                 </a:solidFill>
@@ -8490,106 +8482,6 @@
           </a:prstGeom>
         </p:spPr>
       </p:pic>
-      <p:sp>
-        <p:nvSpPr>
-          <p:cNvPr id="2" name="Arrow: Right 1">
-            <a:extLst>
-              <a:ext uri="{FF2B5EF4-FFF2-40B4-BE49-F238E27FC236}">
-                <a16:creationId xmlns:a16="http://schemas.microsoft.com/office/drawing/2014/main" id="{6EC3AA62-405D-3E1D-AA4D-25AE89B0BFAA}"/>
-              </a:ext>
-            </a:extLst>
-          </p:cNvPr>
-          <p:cNvSpPr/>
-          <p:nvPr/>
-        </p:nvSpPr>
-        <p:spPr>
-          <a:xfrm rot="12269173">
-            <a:off x="7354657" y="2602235"/>
-            <a:ext cx="1569308" cy="525162"/>
-          </a:xfrm>
-          <a:prstGeom prst="rightArrow">
-            <a:avLst/>
-          </a:prstGeom>
-        </p:spPr>
-        <p:style>
-          <a:lnRef idx="2">
-            <a:schemeClr val="accent5">
-              <a:shade val="15000"/>
-            </a:schemeClr>
-          </a:lnRef>
-          <a:fillRef idx="1">
-            <a:schemeClr val="accent5"/>
-          </a:fillRef>
-          <a:effectRef idx="0">
-            <a:schemeClr val="accent5"/>
-          </a:effectRef>
-          <a:fontRef idx="minor">
-            <a:schemeClr val="lt1"/>
-          </a:fontRef>
-        </p:style>
-        <p:txBody>
-          <a:bodyPr rtlCol="0" anchor="ctr"/>
-          <a:lstStyle/>
-          <a:p>
-            <a:pPr algn="ctr"/>
-            <a:endParaRPr lang="nl-NL"/>
-          </a:p>
-        </p:txBody>
-      </p:sp>
-      <p:sp>
-        <p:nvSpPr>
-          <p:cNvPr id="3" name="Rectangle 2">
-            <a:extLst>
-              <a:ext uri="{FF2B5EF4-FFF2-40B4-BE49-F238E27FC236}">
-                <a16:creationId xmlns:a16="http://schemas.microsoft.com/office/drawing/2014/main" id="{4E265E0A-F3C5-9FF8-BDB1-0CB8D633C02C}"/>
-              </a:ext>
-            </a:extLst>
-          </p:cNvPr>
-          <p:cNvSpPr/>
-          <p:nvPr/>
-        </p:nvSpPr>
-        <p:spPr>
-          <a:xfrm>
-            <a:off x="4695568" y="988541"/>
-            <a:ext cx="2669059" cy="1964724"/>
-          </a:xfrm>
-          <a:prstGeom prst="rect">
-            <a:avLst/>
-          </a:prstGeom>
-          <a:noFill/>
-          <a:ln w="57150" cap="flat" cmpd="sng" algn="ctr">
-            <a:solidFill>
-              <a:srgbClr val="0070C0"/>
-            </a:solidFill>
-            <a:prstDash val="solid"/>
-            <a:round/>
-            <a:headEnd type="none" w="med" len="med"/>
-            <a:tailEnd type="none" w="med" len="med"/>
-          </a:ln>
-        </p:spPr>
-        <p:style>
-          <a:lnRef idx="0">
-            <a:scrgbClr r="0" g="0" b="0"/>
-          </a:lnRef>
-          <a:fillRef idx="0">
-            <a:scrgbClr r="0" g="0" b="0"/>
-          </a:fillRef>
-          <a:effectRef idx="0">
-            <a:scrgbClr r="0" g="0" b="0"/>
-          </a:effectRef>
-          <a:fontRef idx="minor">
-            <a:schemeClr val="dk1"/>
-          </a:fontRef>
-        </p:style>
-        <p:txBody>
-          <a:bodyPr rtlCol="0" anchor="ctr"/>
-          <a:lstStyle/>
-          <a:p>
-            <a:pPr algn="ctr"/>
-            <a:endParaRPr lang="nl-NL"/>
-          </a:p>
-        </p:txBody>
-      </p:sp>
     </p:spTree>
     <p:extLst>
       <p:ext uri="{BB962C8B-B14F-4D97-AF65-F5344CB8AC3E}">
@@ -8736,7 +8628,7 @@
           <a:p>
             <a:r>
               <a:rPr lang="nl-NL" sz="3200"/>
-              <a:t>See email sent last Friday</a:t>
+              <a:t>See email sent (??)</a:t>
             </a:r>
           </a:p>
           <a:p>
@@ -8766,7 +8658,7 @@
           <a:p>
             <a:r>
               <a:rPr lang="nl-NL" sz="3200"/>
-              <a:t>E-mail about WSL</a:t>
+              <a:t>E-mail about setup (including WSL)</a:t>
             </a:r>
           </a:p>
           <a:p>
@@ -8780,18 +8672,18 @@
               <a:buNone/>
             </a:pPr>
             <a:r>
-              <a:rPr lang="nl-NL">
+              <a:rPr lang="nl-NL" sz="2800">
                 <a:hlinkClick r:id="rId2"/>
               </a:rPr>
-              <a:t>https://github.com/mjr-deltares/parallel-modflow-dsd23</a:t>
-            </a:r>
-            <a:endParaRPr lang="nl-NL"/>
-          </a:p>
-          <a:p>
-            <a:r>
-              <a:rPr lang="nl-NL" sz="3200"/>
-              <a:t>Need laptop?</a:t>
-            </a:r>
+              <a:t>https://github.com/jdhughes-usgs/modflow-dsd24</a:t>
+            </a:r>
+            <a:endParaRPr lang="nl-NL" sz="2800"/>
+          </a:p>
+          <a:p>
+            <a:pPr marL="457200" lvl="1" indent="0">
+              <a:buNone/>
+            </a:pPr>
+            <a:endParaRPr lang="nl-NL" sz="2800"/>
           </a:p>
         </p:txBody>
       </p:sp>
@@ -9141,55 +9033,6 @@
                       </p:childTnLst>
                     </p:cTn>
                   </p:par>
-                  <p:par>
-                    <p:cTn id="29" fill="hold">
-                      <p:stCondLst>
-                        <p:cond delay="indefinite"/>
-                      </p:stCondLst>
-                      <p:childTnLst>
-                        <p:par>
-                          <p:cTn id="30" fill="hold">
-                            <p:stCondLst>
-                              <p:cond delay="0"/>
-                            </p:stCondLst>
-                            <p:childTnLst>
-                              <p:par>
-                                <p:cTn id="31" presetID="1" presetClass="entr" presetSubtype="0" fill="hold" grpId="0" nodeType="clickEffect">
-                                  <p:stCondLst>
-                                    <p:cond delay="0"/>
-                                  </p:stCondLst>
-                                  <p:childTnLst>
-                                    <p:set>
-                                      <p:cBhvr>
-                                        <p:cTn id="32" dur="1" fill="hold">
-                                          <p:stCondLst>
-                                            <p:cond delay="0"/>
-                                          </p:stCondLst>
-                                        </p:cTn>
-                                        <p:tgtEl>
-                                          <p:spTgt spid="5">
-                                            <p:txEl>
-                                              <p:pRg st="8" end="8"/>
-                                            </p:txEl>
-                                          </p:spTgt>
-                                        </p:tgtEl>
-                                        <p:attrNameLst>
-                                          <p:attrName>style.visibility</p:attrName>
-                                        </p:attrNameLst>
-                                      </p:cBhvr>
-                                      <p:to>
-                                        <p:strVal val="visible"/>
-                                      </p:to>
-                                    </p:set>
-                                  </p:childTnLst>
-                                </p:cTn>
-                              </p:par>
-                            </p:childTnLst>
-                          </p:cTn>
-                        </p:par>
-                      </p:childTnLst>
-                    </p:cTn>
-                  </p:par>
                 </p:childTnLst>
               </p:cTn>
               <p:prevCondLst>
@@ -9567,141 +9410,134 @@
         </p:spPr>
         <p:txBody>
           <a:bodyPr>
-            <a:normAutofit fontScale="62500" lnSpcReduction="20000"/>
+            <a:normAutofit fontScale="77500" lnSpcReduction="20000"/>
           </a:bodyPr>
           <a:lstStyle/>
           <a:p>
-            <a:pPr lvl="0"/>
-            <a:r>
-              <a:rPr lang="en-US" sz="3800"/>
-              <a:t>Overview of MODFLOW 6 and FloPy</a:t>
-            </a:r>
-            <a:endParaRPr lang="nl-NL" sz="3800">
-              <a:solidFill>
-                <a:schemeClr val="bg1">
-                  <a:lumMod val="75000"/>
-                </a:schemeClr>
-              </a:solidFill>
-            </a:endParaRPr>
-          </a:p>
-          <a:p>
-            <a:r>
-              <a:rPr lang="en-US" sz="3800"/>
-              <a:t>Hands-on exercise I: Set up a FloPy model and run</a:t>
-            </a:r>
-            <a:endParaRPr lang="nl-NL" sz="3800">
-              <a:solidFill>
-                <a:schemeClr val="bg1">
-                  <a:lumMod val="75000"/>
-                </a:schemeClr>
-              </a:solidFill>
-            </a:endParaRPr>
-          </a:p>
-          <a:p>
-            <a:pPr marL="0" lvl="0" indent="0">
+            <a:pPr marL="0" indent="0">
               <a:buNone/>
             </a:pPr>
             <a:r>
-              <a:rPr lang="en-US" sz="3800" b="1"/>
-              <a:t>BREAK</a:t>
-            </a:r>
-            <a:r>
-              <a:rPr lang="en-US" sz="3800"/>
-              <a:t> (10:30-10:45)</a:t>
-            </a:r>
-            <a:endParaRPr lang="nl-NL" sz="3800"/>
-          </a:p>
-          <a:p>
-            <a:pPr lvl="0"/>
-            <a:r>
-              <a:rPr lang="en-US" sz="3800"/>
-              <a:t>Hands-on exercise I: Postprocess and partition a model</a:t>
-            </a:r>
-          </a:p>
-          <a:p>
-            <a:pPr lvl="0"/>
-            <a:r>
-              <a:rPr lang="en-US" sz="3800"/>
-              <a:t>Hands-on exercise I: Running parallel MODFLOW 6 </a:t>
-            </a:r>
-            <a:endParaRPr lang="nl-NL" sz="3800"/>
-          </a:p>
-          <a:p>
-            <a:pPr marL="0" lvl="0" indent="0">
+              <a:rPr lang="en-US" b="1"/>
+              <a:t>ARRIVAL</a:t>
+            </a:r>
+            <a:r>
+              <a:rPr lang="en-US"/>
+              <a:t> — 08:30 to 09:00</a:t>
+            </a:r>
+          </a:p>
+          <a:p>
+            <a:r>
+              <a:rPr lang="en-US"/>
+              <a:t>Welcome and Introductions — 09:00 to 09:10</a:t>
+            </a:r>
+          </a:p>
+          <a:p>
+            <a:r>
+              <a:rPr lang="en-US"/>
+              <a:t>Overview of MODFLOW 6 — 09:10 to 09:30</a:t>
+            </a:r>
+          </a:p>
+          <a:p>
+            <a:r>
+              <a:rPr lang="en-US"/>
+              <a:t>Brief introduction to FloPy and pixi — 09:30 to 10:15</a:t>
+            </a:r>
+          </a:p>
+          <a:p>
+            <a:pPr marL="0" indent="0">
               <a:buNone/>
             </a:pPr>
             <a:r>
-              <a:rPr lang="en-US" sz="3800" b="1"/>
-              <a:t>LUNCH</a:t>
-            </a:r>
-            <a:r>
-              <a:rPr lang="en-US" sz="3800"/>
-              <a:t> (12:15-13:15)</a:t>
-            </a:r>
-            <a:endParaRPr lang="nl-NL" sz="3800"/>
-          </a:p>
-          <a:p>
-            <a:pPr lvl="0"/>
-            <a:r>
-              <a:rPr lang="en-US" sz="3800"/>
-              <a:t>Parallel MODFLOW 6: Context and Applications</a:t>
-            </a:r>
-            <a:endParaRPr lang="nl-NL" sz="3800"/>
-          </a:p>
-          <a:p>
-            <a:pPr lvl="0"/>
-            <a:r>
-              <a:rPr lang="en-US" sz="3800"/>
-              <a:t>Hands-on exercise II: Build and partition the watershed</a:t>
-            </a:r>
-            <a:endParaRPr lang="nl-NL" sz="3800"/>
-          </a:p>
-          <a:p>
-            <a:pPr marL="0" lvl="0" indent="0">
+              <a:rPr lang="en-US" b="1"/>
+              <a:t>COFFEE BREAK</a:t>
+            </a:r>
+            <a:r>
+              <a:rPr lang="en-US"/>
+              <a:t> — 10:15 to 10:35</a:t>
+            </a:r>
+          </a:p>
+          <a:p>
+            <a:r>
+              <a:rPr lang="en-US"/>
+              <a:t>Variable density groundwater flow and transport — 10:35 to 11:55</a:t>
+            </a:r>
+          </a:p>
+          <a:p>
+            <a:pPr marL="0" indent="0">
               <a:buNone/>
             </a:pPr>
             <a:r>
-              <a:rPr lang="en-US" sz="3800" b="1"/>
-              <a:t>BREAK</a:t>
-            </a:r>
-            <a:r>
-              <a:rPr lang="en-US" sz="3800"/>
-              <a:t> (15:00-15:15)</a:t>
-            </a:r>
-            <a:endParaRPr lang="nl-NL" sz="3800"/>
-          </a:p>
-          <a:p>
-            <a:pPr lvl="0"/>
-            <a:r>
-              <a:rPr lang="en-US" sz="3800"/>
-              <a:t>Hands-on exercise II: Validate results and parallel performance </a:t>
-            </a:r>
-            <a:endParaRPr lang="nl-NL" sz="3800"/>
-          </a:p>
-          <a:p>
-            <a:pPr lvl="0"/>
-            <a:r>
-              <a:rPr lang="en-US" sz="3800"/>
-              <a:t>(Hands-on alternative: Run your own model in parallel)</a:t>
-            </a:r>
-            <a:endParaRPr lang="nl-NL" sz="3800"/>
-          </a:p>
-          <a:p>
-            <a:pPr lvl="0"/>
-            <a:r>
-              <a:rPr lang="en-US" sz="3800"/>
-              <a:t>Discussion and Wrap up (16:30-17:00)</a:t>
-            </a:r>
-          </a:p>
-          <a:p>
-            <a:pPr marL="0" lvl="0" indent="0">
+              <a:rPr lang="en-US" b="1"/>
+              <a:t>GROUP PICTURE</a:t>
+            </a:r>
+            <a:r>
+              <a:rPr lang="en-US"/>
+              <a:t> — 11:55 to 12:00</a:t>
+            </a:r>
+          </a:p>
+          <a:p>
+            <a:pPr marL="0" indent="0">
               <a:buNone/>
             </a:pPr>
             <a:r>
-              <a:rPr lang="en-US" sz="3800" b="1"/>
+              <a:rPr lang="en-US" b="1"/>
+              <a:t>LUNCH BREAK</a:t>
+            </a:r>
+            <a:r>
+              <a:rPr lang="en-US"/>
+              <a:t> — 12:00 to 13:00</a:t>
+            </a:r>
+          </a:p>
+          <a:p>
+            <a:r>
+              <a:rPr lang="en-US"/>
+              <a:t>Aquifer storage and recovery — 13:00 to 14:30</a:t>
+            </a:r>
+          </a:p>
+          <a:p>
+            <a:pPr marL="0" indent="0">
+              <a:buNone/>
+            </a:pPr>
+            <a:r>
+              <a:rPr lang="en-US" b="1"/>
+              <a:t>COFFEE BREAK</a:t>
+            </a:r>
+            <a:r>
+              <a:rPr lang="en-US"/>
+              <a:t> — 14:30 to 14:50</a:t>
+            </a:r>
+          </a:p>
+          <a:p>
+            <a:r>
+              <a:rPr lang="en-US"/>
+              <a:t>Extended MODFLOW 6 — parallel, netcdf/ugrid — 14:50 to 15:45</a:t>
+            </a:r>
+          </a:p>
+          <a:p>
+            <a:r>
+              <a:rPr lang="en-US"/>
+              <a:t>MODFLOW API demonstration — 15:45 to 16:45</a:t>
+            </a:r>
+          </a:p>
+          <a:p>
+            <a:r>
+              <a:rPr lang="en-US"/>
+              <a:t>Wrap up and evaluation — 16:45 to 17:00</a:t>
+            </a:r>
+          </a:p>
+          <a:p>
+            <a:pPr marL="0" indent="0">
+              <a:buNone/>
+            </a:pPr>
+            <a:r>
+              <a:rPr lang="en-US" b="1"/>
               <a:t>DRINKS</a:t>
             </a:r>
-            <a:endParaRPr lang="nl-NL" sz="3800" b="1"/>
+            <a:r>
+              <a:rPr lang="en-US"/>
+              <a:t> — 17:00 to 18:00</a:t>
+            </a:r>
           </a:p>
           <a:p>
             <a:pPr marL="0" indent="0">
@@ -9775,33 +9611,15 @@
                                   </p:childTnLst>
                                 </p:cTn>
                               </p:par>
-                            </p:childTnLst>
-                          </p:cTn>
-                        </p:par>
-                      </p:childTnLst>
-                    </p:cTn>
-                  </p:par>
-                  <p:par>
-                    <p:cTn id="7" fill="hold">
-                      <p:stCondLst>
-                        <p:cond delay="indefinite"/>
-                      </p:stCondLst>
-                      <p:childTnLst>
-                        <p:par>
-                          <p:cTn id="8" fill="hold">
-                            <p:stCondLst>
-                              <p:cond delay="0"/>
-                            </p:stCondLst>
-                            <p:childTnLst>
                               <p:par>
-                                <p:cTn id="9" presetID="1" presetClass="entr" presetSubtype="0" fill="hold" grpId="0" nodeType="clickEffect">
+                                <p:cTn id="7" presetID="1" presetClass="entr" presetSubtype="0" fill="hold" grpId="0" nodeType="withEffect">
                                   <p:stCondLst>
                                     <p:cond delay="0"/>
                                   </p:stCondLst>
                                   <p:childTnLst>
                                     <p:set>
                                       <p:cBhvr>
-                                        <p:cTn id="10" dur="1" fill="hold">
+                                        <p:cTn id="8" dur="1" fill="hold">
                                           <p:stCondLst>
                                             <p:cond delay="0"/>
                                           </p:stCondLst>
@@ -9824,26 +9642,70 @@
                                   </p:childTnLst>
                                 </p:cTn>
                               </p:par>
-                            </p:childTnLst>
-                          </p:cTn>
-                        </p:par>
-                      </p:childTnLst>
-                    </p:cTn>
-                  </p:par>
-                  <p:par>
-                    <p:cTn id="11" fill="hold">
-                      <p:stCondLst>
-                        <p:cond delay="indefinite"/>
-                      </p:stCondLst>
-                      <p:childTnLst>
-                        <p:par>
-                          <p:cTn id="12" fill="hold">
-                            <p:stCondLst>
-                              <p:cond delay="0"/>
-                            </p:stCondLst>
-                            <p:childTnLst>
                               <p:par>
-                                <p:cTn id="13" presetID="1" presetClass="entr" presetSubtype="0" fill="hold" grpId="0" nodeType="clickEffect">
+                                <p:cTn id="9" presetID="1" presetClass="entr" presetSubtype="0" fill="hold" grpId="0" nodeType="withEffect">
+                                  <p:stCondLst>
+                                    <p:cond delay="0"/>
+                                  </p:stCondLst>
+                                  <p:childTnLst>
+                                    <p:set>
+                                      <p:cBhvr>
+                                        <p:cTn id="10" dur="1" fill="hold">
+                                          <p:stCondLst>
+                                            <p:cond delay="0"/>
+                                          </p:stCondLst>
+                                        </p:cTn>
+                                        <p:tgtEl>
+                                          <p:spTgt spid="15">
+                                            <p:txEl>
+                                              <p:pRg st="2" end="2"/>
+                                            </p:txEl>
+                                          </p:spTgt>
+                                        </p:tgtEl>
+                                        <p:attrNameLst>
+                                          <p:attrName>style.visibility</p:attrName>
+                                        </p:attrNameLst>
+                                      </p:cBhvr>
+                                      <p:to>
+                                        <p:strVal val="visible"/>
+                                      </p:to>
+                                    </p:set>
+                                  </p:childTnLst>
+                                </p:cTn>
+                              </p:par>
+                              <p:par>
+                                <p:cTn id="11" presetID="1" presetClass="entr" presetSubtype="0" fill="hold" grpId="0" nodeType="withEffect">
+                                  <p:stCondLst>
+                                    <p:cond delay="0"/>
+                                  </p:stCondLst>
+                                  <p:childTnLst>
+                                    <p:set>
+                                      <p:cBhvr>
+                                        <p:cTn id="12" dur="1" fill="hold">
+                                          <p:stCondLst>
+                                            <p:cond delay="0"/>
+                                          </p:stCondLst>
+                                        </p:cTn>
+                                        <p:tgtEl>
+                                          <p:spTgt spid="15">
+                                            <p:txEl>
+                                              <p:pRg st="3" end="3"/>
+                                            </p:txEl>
+                                          </p:spTgt>
+                                        </p:tgtEl>
+                                        <p:attrNameLst>
+                                          <p:attrName>style.visibility</p:attrName>
+                                        </p:attrNameLst>
+                                      </p:cBhvr>
+                                      <p:to>
+                                        <p:strVal val="visible"/>
+                                      </p:to>
+                                    </p:set>
+                                  </p:childTnLst>
+                                </p:cTn>
+                              </p:par>
+                              <p:par>
+                                <p:cTn id="13" presetID="1" presetClass="entr" presetSubtype="0" fill="hold" grpId="0" nodeType="withEffect">
                                   <p:stCondLst>
                                     <p:cond delay="0"/>
                                   </p:stCondLst>
@@ -9858,7 +9720,7 @@
                                         <p:tgtEl>
                                           <p:spTgt spid="15">
                                             <p:txEl>
-                                              <p:pRg st="2" end="2"/>
+                                              <p:pRg st="4" end="4"/>
                                             </p:txEl>
                                           </p:spTgt>
                                         </p:tgtEl>
@@ -9889,7 +9751,7 @@
                                         <p:tgtEl>
                                           <p:spTgt spid="15">
                                             <p:txEl>
-                                              <p:pRg st="3" end="3"/>
+                                              <p:pRg st="5" end="5"/>
                                             </p:txEl>
                                           </p:spTgt>
                                         </p:tgtEl>
@@ -9920,7 +9782,7 @@
                                         <p:tgtEl>
                                           <p:spTgt spid="15">
                                             <p:txEl>
-                                              <p:pRg st="4" end="4"/>
+                                              <p:pRg st="6" end="6"/>
                                             </p:txEl>
                                           </p:spTgt>
                                         </p:tgtEl>
@@ -9951,7 +9813,7 @@
                                         <p:tgtEl>
                                           <p:spTgt spid="15">
                                             <p:txEl>
-                                              <p:pRg st="5" end="5"/>
+                                              <p:pRg st="7" end="7"/>
                                             </p:txEl>
                                           </p:spTgt>
                                         </p:tgtEl>
@@ -9982,7 +9844,7 @@
                                         <p:tgtEl>
                                           <p:spTgt spid="15">
                                             <p:txEl>
-                                              <p:pRg st="6" end="6"/>
+                                              <p:pRg st="8" end="8"/>
                                             </p:txEl>
                                           </p:spTgt>
                                         </p:tgtEl>
@@ -10013,7 +9875,7 @@
                                         <p:tgtEl>
                                           <p:spTgt spid="15">
                                             <p:txEl>
-                                              <p:pRg st="7" end="7"/>
+                                              <p:pRg st="9" end="9"/>
                                             </p:txEl>
                                           </p:spTgt>
                                         </p:tgtEl>
@@ -10044,7 +9906,7 @@
                                         <p:tgtEl>
                                           <p:spTgt spid="15">
                                             <p:txEl>
-                                              <p:pRg st="8" end="8"/>
+                                              <p:pRg st="10" end="10"/>
                                             </p:txEl>
                                           </p:spTgt>
                                         </p:tgtEl>
@@ -10075,7 +9937,7 @@
                                         <p:tgtEl>
                                           <p:spTgt spid="15">
                                             <p:txEl>
-                                              <p:pRg st="9" end="9"/>
+                                              <p:pRg st="11" end="11"/>
                                             </p:txEl>
                                           </p:spTgt>
                                         </p:tgtEl>
@@ -10106,7 +9968,7 @@
                                         <p:tgtEl>
                                           <p:spTgt spid="15">
                                             <p:txEl>
-                                              <p:pRg st="10" end="10"/>
+                                              <p:pRg st="12" end="12"/>
                                             </p:txEl>
                                           </p:spTgt>
                                         </p:tgtEl>
@@ -10137,56 +9999,7 @@
                                         <p:tgtEl>
                                           <p:spTgt spid="15">
                                             <p:txEl>
-                                              <p:pRg st="11" end="11"/>
-                                            </p:txEl>
-                                          </p:spTgt>
-                                        </p:tgtEl>
-                                        <p:attrNameLst>
-                                          <p:attrName>style.visibility</p:attrName>
-                                        </p:attrNameLst>
-                                      </p:cBhvr>
-                                      <p:to>
-                                        <p:strVal val="visible"/>
-                                      </p:to>
-                                    </p:set>
-                                  </p:childTnLst>
-                                </p:cTn>
-                              </p:par>
-                            </p:childTnLst>
-                          </p:cTn>
-                        </p:par>
-                      </p:childTnLst>
-                    </p:cTn>
-                  </p:par>
-                  <p:par>
-                    <p:cTn id="33" fill="hold">
-                      <p:stCondLst>
-                        <p:cond delay="indefinite"/>
-                      </p:stCondLst>
-                      <p:childTnLst>
-                        <p:par>
-                          <p:cTn id="34" fill="hold">
-                            <p:stCondLst>
-                              <p:cond delay="0"/>
-                            </p:stCondLst>
-                            <p:childTnLst>
-                              <p:par>
-                                <p:cTn id="35" presetID="1" presetClass="entr" presetSubtype="0" fill="hold" grpId="0" nodeType="clickEffect">
-                                  <p:stCondLst>
-                                    <p:cond delay="0"/>
-                                  </p:stCondLst>
-                                  <p:childTnLst>
-                                    <p:set>
-                                      <p:cBhvr>
-                                        <p:cTn id="36" dur="1" fill="hold">
-                                          <p:stCondLst>
-                                            <p:cond delay="0"/>
-                                          </p:stCondLst>
-                                        </p:cTn>
-                                        <p:tgtEl>
-                                          <p:spTgt spid="15">
-                                            <p:txEl>
-                                              <p:pRg st="12" end="12"/>
+                                              <p:pRg st="13" end="13"/>
                                             </p:txEl>
                                           </p:spTgt>
                                         </p:tgtEl>

</xml_diff>